<commit_message>
Edit Public Sector and Local Business pages to have <a> tag within <button>
</commit_message>
<xml_diff>
--- a/M1Project - Peformance Testing.pptx
+++ b/M1Project - Peformance Testing.pptx
@@ -5,10 +5,10 @@
     <p:sldMasterId id="2147483648" r:id="rId1"/>
   </p:sldMasterIdLst>
   <p:sldIdLst>
-    <p:sldId id="257" r:id="rId2"/>
-    <p:sldId id="256" r:id="rId3"/>
-    <p:sldId id="258" r:id="rId4"/>
-    <p:sldId id="259" r:id="rId5"/>
+    <p:sldId id="259" r:id="rId2"/>
+    <p:sldId id="257" r:id="rId3"/>
+    <p:sldId id="256" r:id="rId4"/>
+    <p:sldId id="258" r:id="rId5"/>
     <p:sldId id="260" r:id="rId6"/>
   </p:sldIdLst>
   <p:sldSz cx="12192000" cy="6858000"/>
@@ -108,6 +108,11 @@
       </a:defRPr>
     </a:lvl9pPr>
   </p:defaultTextStyle>
+  <p:extLst>
+    <p:ext uri="{EFAFB233-063F-42B5-8137-9DF3F51BA10A}">
+      <p15:sldGuideLst xmlns:p15="http://schemas.microsoft.com/office/powerpoint/2012/main"/>
+    </p:ext>
+  </p:extLst>
 </p:presentation>
 </file>
 
@@ -3346,6 +3351,65 @@
           <a:chExt cx="0" cy="0"/>
         </a:xfrm>
       </p:grpSpPr>
+      <p:pic>
+        <p:nvPicPr>
+          <p:cNvPr id="5" name="Picture 4">
+            <a:extLst>
+              <a:ext uri="{FF2B5EF4-FFF2-40B4-BE49-F238E27FC236}">
+                <a16:creationId xmlns:a16="http://schemas.microsoft.com/office/drawing/2014/main" id="{AA369FE0-E4B3-CECF-5E71-9D79C3CA721D}"/>
+              </a:ext>
+            </a:extLst>
+          </p:cNvPr>
+          <p:cNvPicPr>
+            <a:picLocks noChangeAspect="1"/>
+          </p:cNvPicPr>
+          <p:nvPr/>
+        </p:nvPicPr>
+        <p:blipFill rotWithShape="1">
+          <a:blip r:embed="rId2"/>
+          <a:srcRect t="45556" r="3750" b="12084"/>
+          <a:stretch/>
+        </p:blipFill>
+        <p:spPr>
+          <a:xfrm>
+            <a:off x="228600" y="1819275"/>
+            <a:ext cx="11734800" cy="2905125"/>
+          </a:xfrm>
+          <a:prstGeom prst="rect">
+            <a:avLst/>
+          </a:prstGeom>
+        </p:spPr>
+      </p:pic>
+    </p:spTree>
+    <p:extLst>
+      <p:ext uri="{BB962C8B-B14F-4D97-AF65-F5344CB8AC3E}">
+        <p14:creationId xmlns:p14="http://schemas.microsoft.com/office/powerpoint/2010/main" val="3955921744"/>
+      </p:ext>
+    </p:extLst>
+  </p:cSld>
+  <p:clrMapOvr>
+    <a:masterClrMapping/>
+  </p:clrMapOvr>
+</p:sld>
+</file>
+
+<file path=ppt/slides/slide2.xml><?xml version="1.0" encoding="utf-8"?>
+<p:sld xmlns:a="http://schemas.openxmlformats.org/drawingml/2006/main" xmlns:r="http://schemas.openxmlformats.org/officeDocument/2006/relationships" xmlns:p="http://schemas.openxmlformats.org/presentationml/2006/main">
+  <p:cSld>
+    <p:spTree>
+      <p:nvGrpSpPr>
+        <p:cNvPr id="1" name=""/>
+        <p:cNvGrpSpPr/>
+        <p:nvPr/>
+      </p:nvGrpSpPr>
+      <p:grpSpPr>
+        <a:xfrm>
+          <a:off x="0" y="0"/>
+          <a:ext cx="0" cy="0"/>
+          <a:chOff x="0" y="0"/>
+          <a:chExt cx="0" cy="0"/>
+        </a:xfrm>
+      </p:grpSpPr>
       <p:sp>
         <p:nvSpPr>
           <p:cNvPr id="2" name="TextBox 1">
@@ -3489,7 +3553,7 @@
 </p:sld>
 </file>
 
-<file path=ppt/slides/slide2.xml><?xml version="1.0" encoding="utf-8"?>
+<file path=ppt/slides/slide3.xml><?xml version="1.0" encoding="utf-8"?>
 <p:sld xmlns:a="http://schemas.openxmlformats.org/drawingml/2006/main" xmlns:r="http://schemas.openxmlformats.org/officeDocument/2006/relationships" xmlns:p="http://schemas.openxmlformats.org/presentationml/2006/main">
   <p:cSld>
     <p:spTree>
@@ -3649,7 +3713,7 @@
 </p:sld>
 </file>
 
-<file path=ppt/slides/slide3.xml><?xml version="1.0" encoding="utf-8"?>
+<file path=ppt/slides/slide4.xml><?xml version="1.0" encoding="utf-8"?>
 <p:sld xmlns:a="http://schemas.openxmlformats.org/drawingml/2006/main" xmlns:r="http://schemas.openxmlformats.org/officeDocument/2006/relationships" xmlns:p="http://schemas.openxmlformats.org/presentationml/2006/main">
   <p:cSld>
     <p:spTree>
@@ -3679,36 +3743,6 @@
 </p:sld>
 </file>
 
-<file path=ppt/slides/slide4.xml><?xml version="1.0" encoding="utf-8"?>
-<p:sld xmlns:a="http://schemas.openxmlformats.org/drawingml/2006/main" xmlns:r="http://schemas.openxmlformats.org/officeDocument/2006/relationships" xmlns:p="http://schemas.openxmlformats.org/presentationml/2006/main">
-  <p:cSld>
-    <p:spTree>
-      <p:nvGrpSpPr>
-        <p:cNvPr id="1" name=""/>
-        <p:cNvGrpSpPr/>
-        <p:nvPr/>
-      </p:nvGrpSpPr>
-      <p:grpSpPr>
-        <a:xfrm>
-          <a:off x="0" y="0"/>
-          <a:ext cx="0" cy="0"/>
-          <a:chOff x="0" y="0"/>
-          <a:chExt cx="0" cy="0"/>
-        </a:xfrm>
-      </p:grpSpPr>
-    </p:spTree>
-    <p:extLst>
-      <p:ext uri="{BB962C8B-B14F-4D97-AF65-F5344CB8AC3E}">
-        <p14:creationId xmlns:p14="http://schemas.microsoft.com/office/powerpoint/2010/main" val="3955921744"/>
-      </p:ext>
-    </p:extLst>
-  </p:cSld>
-  <p:clrMapOvr>
-    <a:masterClrMapping/>
-  </p:clrMapOvr>
-</p:sld>
-</file>
-
 <file path=ppt/slides/slide5.xml><?xml version="1.0" encoding="utf-8"?>
 <p:sld xmlns:a="http://schemas.openxmlformats.org/drawingml/2006/main" xmlns:r="http://schemas.openxmlformats.org/officeDocument/2006/relationships" xmlns:p="http://schemas.openxmlformats.org/presentationml/2006/main">
   <p:cSld>
@@ -3726,6 +3760,70 @@
           <a:chExt cx="0" cy="0"/>
         </a:xfrm>
       </p:grpSpPr>
+      <p:pic>
+        <p:nvPicPr>
+          <p:cNvPr id="3" name="Picture 2">
+            <a:extLst>
+              <a:ext uri="{FF2B5EF4-FFF2-40B4-BE49-F238E27FC236}">
+                <a16:creationId xmlns:a16="http://schemas.microsoft.com/office/drawing/2014/main" id="{7E3D9DE6-E8EC-3BA8-5793-1AD482B5C335}"/>
+              </a:ext>
+            </a:extLst>
+          </p:cNvPr>
+          <p:cNvPicPr>
+            <a:picLocks noChangeAspect="1"/>
+          </p:cNvPicPr>
+          <p:nvPr/>
+        </p:nvPicPr>
+        <p:blipFill rotWithShape="1">
+          <a:blip r:embed="rId2"/>
+          <a:srcRect t="14015"/>
+          <a:stretch/>
+        </p:blipFill>
+        <p:spPr>
+          <a:xfrm>
+            <a:off x="497149" y="1583739"/>
+            <a:ext cx="8940800" cy="4324350"/>
+          </a:xfrm>
+          <a:prstGeom prst="rect">
+            <a:avLst/>
+          </a:prstGeom>
+        </p:spPr>
+      </p:pic>
+      <p:sp>
+        <p:nvSpPr>
+          <p:cNvPr id="5" name="TextBox 4">
+            <a:extLst>
+              <a:ext uri="{FF2B5EF4-FFF2-40B4-BE49-F238E27FC236}">
+                <a16:creationId xmlns:a16="http://schemas.microsoft.com/office/drawing/2014/main" id="{0AE98E5B-A6B3-0876-689A-5E4BA972AC83}"/>
+              </a:ext>
+            </a:extLst>
+          </p:cNvPr>
+          <p:cNvSpPr txBox="1"/>
+          <p:nvPr/>
+        </p:nvSpPr>
+        <p:spPr>
+          <a:xfrm>
+            <a:off x="1849515" y="421235"/>
+            <a:ext cx="6096000" cy="369332"/>
+          </a:xfrm>
+          <a:prstGeom prst="rect">
+            <a:avLst/>
+          </a:prstGeom>
+          <a:noFill/>
+        </p:spPr>
+        <p:txBody>
+          <a:bodyPr wrap="square">
+            <a:spAutoFit/>
+          </a:bodyPr>
+          <a:lstStyle/>
+          <a:p>
+            <a:r>
+              <a:rPr lang="en-GB" dirty="0"/>
+              <a:t>Styles.css</a:t>
+            </a:r>
+          </a:p>
+        </p:txBody>
+      </p:sp>
     </p:spTree>
     <p:extLst>
       <p:ext uri="{BB962C8B-B14F-4D97-AF65-F5344CB8AC3E}">

</xml_diff>